<commit_message>
feat: Refines README for clarity and showcases enhanced features
Improves documentation organization, clarifies setup and usage steps,
and highlights new intelligent connection algorithms and scoring logic.
Adds output example for better user understanding and emphasizes
decision-making enhancements for more natural, stable diagram generation.
</commit_message>
<xml_diff>
--- a/智能连接图表_v2.0输出.pptx
+++ b/智能连接图表_v2.0输出.pptx
@@ -1,11 +1,11 @@
 
 <file path=ppt/presentation.xml><?xml version="1.0" encoding="utf-8"?>
-<p:presentation xmlns:a="http://schemas.openxmlformats.org/drawingml/2006/main" xmlns:r="http://schemas.openxmlformats.org/officeDocument/2006/relationships" xmlns:p="http://schemas.openxmlformats.org/presentationml/2006/main" saveSubsetFonts="1" autoCompressPictures="0">
+<p:presentation xmlns:a="http://schemas.openxmlformats.org/drawingml/2006/main" xmlns:r="http://schemas.openxmlformats.org/officeDocument/2006/relationships" xmlns:p="http://schemas.openxmlformats.org/presentationml/2006/main" autoCompressPictures="0">
   <p:sldMasterIdLst>
     <p:sldMasterId id="2147483648" r:id="rId1"/>
   </p:sldMasterIdLst>
   <p:sldIdLst>
-    <p:sldId id="256" r:id="rId7"/>
+    <p:sldId id="256" r:id="rId3"/>
   </p:sldIdLst>
   <p:sldSz cx="9144000" cy="6858000" type="screen4x3"/>
   <p:notesSz cx="6858000" cy="9144000"/>
@@ -104,6 +104,22 @@
       </a:defRPr>
     </a:lvl9pPr>
   </p:defaultTextStyle>
+  <p:extLst>
+    <p:ext uri="{EFAFB233-063F-42B5-8137-9DF3F51BA10A}">
+      <p15:sldGuideLst xmlns:p15="http://schemas.microsoft.com/office/powerpoint/2012/main">
+        <p15:guide id="1" orient="horz" pos="2160" userDrawn="1">
+          <p15:clr>
+            <a:srgbClr val="A4A3A4"/>
+          </p15:clr>
+        </p15:guide>
+        <p15:guide id="2" pos="2880" userDrawn="1">
+          <p15:clr>
+            <a:srgbClr val="A4A3A4"/>
+          </p15:clr>
+        </p15:guide>
+      </p15:sldGuideLst>
+    </p:ext>
+  </p:extLst>
 </p:presentation>
 </file>
 
@@ -288,7 +304,6 @@
           <a:p>
             <a:fld id="{5BCAD085-E8A6-8845-BD4E-CB4CCA059FC4}" type="datetimeFigureOut">
               <a:rPr lang="en-US" smtClean="0"/>
-              <a:t>1/27/13</a:t>
             </a:fld>
             <a:endParaRPr lang="en-US"/>
           </a:p>
@@ -330,18 +345,12 @@
           <a:p>
             <a:fld id="{C1FF6DA9-008F-8B48-92A6-B652298478BF}" type="slidenum">
               <a:rPr lang="en-US" smtClean="0"/>
-              <a:t>‹#›</a:t>
             </a:fld>
             <a:endParaRPr lang="en-US"/>
           </a:p>
         </p:txBody>
       </p:sp>
     </p:spTree>
-    <p:extLst>
-      <p:ext uri="{BB962C8B-B14F-4D97-AF65-F5344CB8AC3E}">
-        <p14:creationId xmlns:p14="http://schemas.microsoft.com/office/powerpoint/2010/main" val="3168075583"/>
-      </p:ext>
-    </p:extLst>
   </p:cSld>
   <p:clrMapOvr>
     <a:masterClrMapping/>
@@ -409,6 +418,7 @@
               <a:rPr lang="en-US" smtClean="0"/>
               <a:t>Click to edit Master text styles</a:t>
             </a:r>
+            <a:endParaRPr lang="en-US" smtClean="0"/>
           </a:p>
           <a:p>
             <a:pPr lvl="1"/>
@@ -416,6 +426,7 @@
               <a:rPr lang="en-US" smtClean="0"/>
               <a:t>Second level</a:t>
             </a:r>
+            <a:endParaRPr lang="en-US" smtClean="0"/>
           </a:p>
           <a:p>
             <a:pPr lvl="2"/>
@@ -423,6 +434,7 @@
               <a:rPr lang="en-US" smtClean="0"/>
               <a:t>Third level</a:t>
             </a:r>
+            <a:endParaRPr lang="en-US" smtClean="0"/>
           </a:p>
           <a:p>
             <a:pPr lvl="3"/>
@@ -430,6 +442,7 @@
               <a:rPr lang="en-US" smtClean="0"/>
               <a:t>Fourth level</a:t>
             </a:r>
+            <a:endParaRPr lang="en-US" smtClean="0"/>
           </a:p>
           <a:p>
             <a:pPr lvl="4"/>
@@ -458,7 +471,6 @@
           <a:p>
             <a:fld id="{5BCAD085-E8A6-8845-BD4E-CB4CCA059FC4}" type="datetimeFigureOut">
               <a:rPr lang="en-US" smtClean="0"/>
-              <a:t>1/27/13</a:t>
             </a:fld>
             <a:endParaRPr lang="en-US"/>
           </a:p>
@@ -500,18 +512,12 @@
           <a:p>
             <a:fld id="{C1FF6DA9-008F-8B48-92A6-B652298478BF}" type="slidenum">
               <a:rPr lang="en-US" smtClean="0"/>
-              <a:t>‹#›</a:t>
             </a:fld>
             <a:endParaRPr lang="en-US"/>
           </a:p>
         </p:txBody>
       </p:sp>
     </p:spTree>
-    <p:extLst>
-      <p:ext uri="{BB962C8B-B14F-4D97-AF65-F5344CB8AC3E}">
-        <p14:creationId xmlns:p14="http://schemas.microsoft.com/office/powerpoint/2010/main" val="2910927964"/>
-      </p:ext>
-    </p:extLst>
   </p:cSld>
   <p:clrMapOvr>
     <a:masterClrMapping/>
@@ -589,6 +595,7 @@
               <a:rPr lang="en-US" smtClean="0"/>
               <a:t>Click to edit Master text styles</a:t>
             </a:r>
+            <a:endParaRPr lang="en-US" smtClean="0"/>
           </a:p>
           <a:p>
             <a:pPr lvl="1"/>
@@ -596,6 +603,7 @@
               <a:rPr lang="en-US" smtClean="0"/>
               <a:t>Second level</a:t>
             </a:r>
+            <a:endParaRPr lang="en-US" smtClean="0"/>
           </a:p>
           <a:p>
             <a:pPr lvl="2"/>
@@ -603,6 +611,7 @@
               <a:rPr lang="en-US" smtClean="0"/>
               <a:t>Third level</a:t>
             </a:r>
+            <a:endParaRPr lang="en-US" smtClean="0"/>
           </a:p>
           <a:p>
             <a:pPr lvl="3"/>
@@ -610,6 +619,7 @@
               <a:rPr lang="en-US" smtClean="0"/>
               <a:t>Fourth level</a:t>
             </a:r>
+            <a:endParaRPr lang="en-US" smtClean="0"/>
           </a:p>
           <a:p>
             <a:pPr lvl="4"/>
@@ -638,7 +648,6 @@
           <a:p>
             <a:fld id="{5BCAD085-E8A6-8845-BD4E-CB4CCA059FC4}" type="datetimeFigureOut">
               <a:rPr lang="en-US" smtClean="0"/>
-              <a:t>1/27/13</a:t>
             </a:fld>
             <a:endParaRPr lang="en-US"/>
           </a:p>
@@ -680,18 +689,12 @@
           <a:p>
             <a:fld id="{C1FF6DA9-008F-8B48-92A6-B652298478BF}" type="slidenum">
               <a:rPr lang="en-US" smtClean="0"/>
-              <a:t>‹#›</a:t>
             </a:fld>
             <a:endParaRPr lang="en-US"/>
           </a:p>
         </p:txBody>
       </p:sp>
     </p:spTree>
-    <p:extLst>
-      <p:ext uri="{BB962C8B-B14F-4D97-AF65-F5344CB8AC3E}">
-        <p14:creationId xmlns:p14="http://schemas.microsoft.com/office/powerpoint/2010/main" val="3612223792"/>
-      </p:ext>
-    </p:extLst>
   </p:cSld>
   <p:clrMapOvr>
     <a:masterClrMapping/>
@@ -759,6 +762,7 @@
               <a:rPr lang="en-US" smtClean="0"/>
               <a:t>Click to edit Master text styles</a:t>
             </a:r>
+            <a:endParaRPr lang="en-US" smtClean="0"/>
           </a:p>
           <a:p>
             <a:pPr lvl="1"/>
@@ -766,6 +770,7 @@
               <a:rPr lang="en-US" smtClean="0"/>
               <a:t>Second level</a:t>
             </a:r>
+            <a:endParaRPr lang="en-US" smtClean="0"/>
           </a:p>
           <a:p>
             <a:pPr lvl="2"/>
@@ -773,6 +778,7 @@
               <a:rPr lang="en-US" smtClean="0"/>
               <a:t>Third level</a:t>
             </a:r>
+            <a:endParaRPr lang="en-US" smtClean="0"/>
           </a:p>
           <a:p>
             <a:pPr lvl="3"/>
@@ -780,6 +786,7 @@
               <a:rPr lang="en-US" smtClean="0"/>
               <a:t>Fourth level</a:t>
             </a:r>
+            <a:endParaRPr lang="en-US" smtClean="0"/>
           </a:p>
           <a:p>
             <a:pPr lvl="4"/>
@@ -808,7 +815,6 @@
           <a:p>
             <a:fld id="{5BCAD085-E8A6-8845-BD4E-CB4CCA059FC4}" type="datetimeFigureOut">
               <a:rPr lang="en-US" smtClean="0"/>
-              <a:t>1/27/13</a:t>
             </a:fld>
             <a:endParaRPr lang="en-US"/>
           </a:p>
@@ -850,18 +856,12 @@
           <a:p>
             <a:fld id="{C1FF6DA9-008F-8B48-92A6-B652298478BF}" type="slidenum">
               <a:rPr lang="en-US" smtClean="0"/>
-              <a:t>‹#›</a:t>
             </a:fld>
             <a:endParaRPr lang="en-US"/>
           </a:p>
         </p:txBody>
       </p:sp>
     </p:spTree>
-    <p:extLst>
-      <p:ext uri="{BB962C8B-B14F-4D97-AF65-F5344CB8AC3E}">
-        <p14:creationId xmlns:p14="http://schemas.microsoft.com/office/powerpoint/2010/main" val="2614314258"/>
-      </p:ext>
-    </p:extLst>
   </p:cSld>
   <p:clrMapOvr>
     <a:masterClrMapping/>
@@ -1034,6 +1034,7 @@
               <a:rPr lang="en-US" smtClean="0"/>
               <a:t>Click to edit Master text styles</a:t>
             </a:r>
+            <a:endParaRPr lang="en-US" smtClean="0"/>
           </a:p>
         </p:txBody>
       </p:sp>
@@ -1054,7 +1055,6 @@
           <a:p>
             <a:fld id="{5BCAD085-E8A6-8845-BD4E-CB4CCA059FC4}" type="datetimeFigureOut">
               <a:rPr lang="en-US" smtClean="0"/>
-              <a:t>1/27/13</a:t>
             </a:fld>
             <a:endParaRPr lang="en-US"/>
           </a:p>
@@ -1096,18 +1096,12 @@
           <a:p>
             <a:fld id="{C1FF6DA9-008F-8B48-92A6-B652298478BF}" type="slidenum">
               <a:rPr lang="en-US" smtClean="0"/>
-              <a:t>‹#›</a:t>
             </a:fld>
             <a:endParaRPr lang="en-US"/>
           </a:p>
         </p:txBody>
       </p:sp>
     </p:spTree>
-    <p:extLst>
-      <p:ext uri="{BB962C8B-B14F-4D97-AF65-F5344CB8AC3E}">
-        <p14:creationId xmlns:p14="http://schemas.microsoft.com/office/powerpoint/2010/main" val="960648375"/>
-      </p:ext>
-    </p:extLst>
   </p:cSld>
   <p:clrMapOvr>
     <a:masterClrMapping/>
@@ -1208,6 +1202,7 @@
               <a:rPr lang="en-US" smtClean="0"/>
               <a:t>Click to edit Master text styles</a:t>
             </a:r>
+            <a:endParaRPr lang="en-US" smtClean="0"/>
           </a:p>
           <a:p>
             <a:pPr lvl="1"/>
@@ -1215,6 +1210,7 @@
               <a:rPr lang="en-US" smtClean="0"/>
               <a:t>Second level</a:t>
             </a:r>
+            <a:endParaRPr lang="en-US" smtClean="0"/>
           </a:p>
           <a:p>
             <a:pPr lvl="2"/>
@@ -1222,6 +1218,7 @@
               <a:rPr lang="en-US" smtClean="0"/>
               <a:t>Third level</a:t>
             </a:r>
+            <a:endParaRPr lang="en-US" smtClean="0"/>
           </a:p>
           <a:p>
             <a:pPr lvl="3"/>
@@ -1229,6 +1226,7 @@
               <a:rPr lang="en-US" smtClean="0"/>
               <a:t>Fourth level</a:t>
             </a:r>
+            <a:endParaRPr lang="en-US" smtClean="0"/>
           </a:p>
           <a:p>
             <a:pPr lvl="4"/>
@@ -1293,6 +1291,7 @@
               <a:rPr lang="en-US" smtClean="0"/>
               <a:t>Click to edit Master text styles</a:t>
             </a:r>
+            <a:endParaRPr lang="en-US" smtClean="0"/>
           </a:p>
           <a:p>
             <a:pPr lvl="1"/>
@@ -1300,6 +1299,7 @@
               <a:rPr lang="en-US" smtClean="0"/>
               <a:t>Second level</a:t>
             </a:r>
+            <a:endParaRPr lang="en-US" smtClean="0"/>
           </a:p>
           <a:p>
             <a:pPr lvl="2"/>
@@ -1307,6 +1307,7 @@
               <a:rPr lang="en-US" smtClean="0"/>
               <a:t>Third level</a:t>
             </a:r>
+            <a:endParaRPr lang="en-US" smtClean="0"/>
           </a:p>
           <a:p>
             <a:pPr lvl="3"/>
@@ -1314,6 +1315,7 @@
               <a:rPr lang="en-US" smtClean="0"/>
               <a:t>Fourth level</a:t>
             </a:r>
+            <a:endParaRPr lang="en-US" smtClean="0"/>
           </a:p>
           <a:p>
             <a:pPr lvl="4"/>
@@ -1342,7 +1344,6 @@
           <a:p>
             <a:fld id="{5BCAD085-E8A6-8845-BD4E-CB4CCA059FC4}" type="datetimeFigureOut">
               <a:rPr lang="en-US" smtClean="0"/>
-              <a:t>1/27/13</a:t>
             </a:fld>
             <a:endParaRPr lang="en-US"/>
           </a:p>
@@ -1384,18 +1385,12 @@
           <a:p>
             <a:fld id="{C1FF6DA9-008F-8B48-92A6-B652298478BF}" type="slidenum">
               <a:rPr lang="en-US" smtClean="0"/>
-              <a:t>‹#›</a:t>
             </a:fld>
             <a:endParaRPr lang="en-US"/>
           </a:p>
         </p:txBody>
       </p:sp>
     </p:spTree>
-    <p:extLst>
-      <p:ext uri="{BB962C8B-B14F-4D97-AF65-F5344CB8AC3E}">
-        <p14:creationId xmlns:p14="http://schemas.microsoft.com/office/powerpoint/2010/main" val="2782244947"/>
-      </p:ext>
-    </p:extLst>
   </p:cSld>
   <p:clrMapOvr>
     <a:masterClrMapping/>
@@ -1509,6 +1504,7 @@
               <a:rPr lang="en-US" smtClean="0"/>
               <a:t>Click to edit Master text styles</a:t>
             </a:r>
+            <a:endParaRPr lang="en-US" smtClean="0"/>
           </a:p>
         </p:txBody>
       </p:sp>
@@ -1565,6 +1561,7 @@
               <a:rPr lang="en-US" smtClean="0"/>
               <a:t>Click to edit Master text styles</a:t>
             </a:r>
+            <a:endParaRPr lang="en-US" smtClean="0"/>
           </a:p>
           <a:p>
             <a:pPr lvl="1"/>
@@ -1572,6 +1569,7 @@
               <a:rPr lang="en-US" smtClean="0"/>
               <a:t>Second level</a:t>
             </a:r>
+            <a:endParaRPr lang="en-US" smtClean="0"/>
           </a:p>
           <a:p>
             <a:pPr lvl="2"/>
@@ -1579,6 +1577,7 @@
               <a:rPr lang="en-US" smtClean="0"/>
               <a:t>Third level</a:t>
             </a:r>
+            <a:endParaRPr lang="en-US" smtClean="0"/>
           </a:p>
           <a:p>
             <a:pPr lvl="3"/>
@@ -1586,6 +1585,7 @@
               <a:rPr lang="en-US" smtClean="0"/>
               <a:t>Fourth level</a:t>
             </a:r>
+            <a:endParaRPr lang="en-US" smtClean="0"/>
           </a:p>
           <a:p>
             <a:pPr lvl="4"/>
@@ -1659,6 +1659,7 @@
               <a:rPr lang="en-US" smtClean="0"/>
               <a:t>Click to edit Master text styles</a:t>
             </a:r>
+            <a:endParaRPr lang="en-US" smtClean="0"/>
           </a:p>
         </p:txBody>
       </p:sp>
@@ -1715,6 +1716,7 @@
               <a:rPr lang="en-US" smtClean="0"/>
               <a:t>Click to edit Master text styles</a:t>
             </a:r>
+            <a:endParaRPr lang="en-US" smtClean="0"/>
           </a:p>
           <a:p>
             <a:pPr lvl="1"/>
@@ -1722,6 +1724,7 @@
               <a:rPr lang="en-US" smtClean="0"/>
               <a:t>Second level</a:t>
             </a:r>
+            <a:endParaRPr lang="en-US" smtClean="0"/>
           </a:p>
           <a:p>
             <a:pPr lvl="2"/>
@@ -1729,6 +1732,7 @@
               <a:rPr lang="en-US" smtClean="0"/>
               <a:t>Third level</a:t>
             </a:r>
+            <a:endParaRPr lang="en-US" smtClean="0"/>
           </a:p>
           <a:p>
             <a:pPr lvl="3"/>
@@ -1736,6 +1740,7 @@
               <a:rPr lang="en-US" smtClean="0"/>
               <a:t>Fourth level</a:t>
             </a:r>
+            <a:endParaRPr lang="en-US" smtClean="0"/>
           </a:p>
           <a:p>
             <a:pPr lvl="4"/>
@@ -1764,7 +1769,6 @@
           <a:p>
             <a:fld id="{5BCAD085-E8A6-8845-BD4E-CB4CCA059FC4}" type="datetimeFigureOut">
               <a:rPr lang="en-US" smtClean="0"/>
-              <a:t>1/27/13</a:t>
             </a:fld>
             <a:endParaRPr lang="en-US"/>
           </a:p>
@@ -1806,18 +1810,12 @@
           <a:p>
             <a:fld id="{C1FF6DA9-008F-8B48-92A6-B652298478BF}" type="slidenum">
               <a:rPr lang="en-US" smtClean="0"/>
-              <a:t>‹#›</a:t>
             </a:fld>
             <a:endParaRPr lang="en-US"/>
           </a:p>
         </p:txBody>
       </p:sp>
     </p:spTree>
-    <p:extLst>
-      <p:ext uri="{BB962C8B-B14F-4D97-AF65-F5344CB8AC3E}">
-        <p14:creationId xmlns:p14="http://schemas.microsoft.com/office/powerpoint/2010/main" val="990158736"/>
-      </p:ext>
-    </p:extLst>
   </p:cSld>
   <p:clrMapOvr>
     <a:masterClrMapping/>
@@ -1882,7 +1880,6 @@
           <a:p>
             <a:fld id="{5BCAD085-E8A6-8845-BD4E-CB4CCA059FC4}" type="datetimeFigureOut">
               <a:rPr lang="en-US" smtClean="0"/>
-              <a:t>1/27/13</a:t>
             </a:fld>
             <a:endParaRPr lang="en-US"/>
           </a:p>
@@ -1924,18 +1921,12 @@
           <a:p>
             <a:fld id="{C1FF6DA9-008F-8B48-92A6-B652298478BF}" type="slidenum">
               <a:rPr lang="en-US" smtClean="0"/>
-              <a:t>‹#›</a:t>
             </a:fld>
             <a:endParaRPr lang="en-US"/>
           </a:p>
         </p:txBody>
       </p:sp>
     </p:spTree>
-    <p:extLst>
-      <p:ext uri="{BB962C8B-B14F-4D97-AF65-F5344CB8AC3E}">
-        <p14:creationId xmlns:p14="http://schemas.microsoft.com/office/powerpoint/2010/main" val="727027711"/>
-      </p:ext>
-    </p:extLst>
   </p:cSld>
   <p:clrMapOvr>
     <a:masterClrMapping/>
@@ -1977,7 +1968,6 @@
           <a:p>
             <a:fld id="{5BCAD085-E8A6-8845-BD4E-CB4CCA059FC4}" type="datetimeFigureOut">
               <a:rPr lang="en-US" smtClean="0"/>
-              <a:t>1/27/13</a:t>
             </a:fld>
             <a:endParaRPr lang="en-US"/>
           </a:p>
@@ -2019,18 +2009,12 @@
           <a:p>
             <a:fld id="{C1FF6DA9-008F-8B48-92A6-B652298478BF}" type="slidenum">
               <a:rPr lang="en-US" smtClean="0"/>
-              <a:t>‹#›</a:t>
             </a:fld>
             <a:endParaRPr lang="en-US"/>
           </a:p>
         </p:txBody>
       </p:sp>
     </p:spTree>
-    <p:extLst>
-      <p:ext uri="{BB962C8B-B14F-4D97-AF65-F5344CB8AC3E}">
-        <p14:creationId xmlns:p14="http://schemas.microsoft.com/office/powerpoint/2010/main" val="1212999818"/>
-      </p:ext>
-    </p:extLst>
   </p:cSld>
   <p:clrMapOvr>
     <a:masterClrMapping/>
@@ -2140,6 +2124,7 @@
               <a:rPr lang="en-US" smtClean="0"/>
               <a:t>Click to edit Master text styles</a:t>
             </a:r>
+            <a:endParaRPr lang="en-US" smtClean="0"/>
           </a:p>
           <a:p>
             <a:pPr lvl="1"/>
@@ -2147,6 +2132,7 @@
               <a:rPr lang="en-US" smtClean="0"/>
               <a:t>Second level</a:t>
             </a:r>
+            <a:endParaRPr lang="en-US" smtClean="0"/>
           </a:p>
           <a:p>
             <a:pPr lvl="2"/>
@@ -2154,6 +2140,7 @@
               <a:rPr lang="en-US" smtClean="0"/>
               <a:t>Third level</a:t>
             </a:r>
+            <a:endParaRPr lang="en-US" smtClean="0"/>
           </a:p>
           <a:p>
             <a:pPr lvl="3"/>
@@ -2161,6 +2148,7 @@
               <a:rPr lang="en-US" smtClean="0"/>
               <a:t>Fourth level</a:t>
             </a:r>
+            <a:endParaRPr lang="en-US" smtClean="0"/>
           </a:p>
           <a:p>
             <a:pPr lvl="4"/>
@@ -2234,6 +2222,7 @@
               <a:rPr lang="en-US" smtClean="0"/>
               <a:t>Click to edit Master text styles</a:t>
             </a:r>
+            <a:endParaRPr lang="en-US" smtClean="0"/>
           </a:p>
         </p:txBody>
       </p:sp>
@@ -2254,7 +2243,6 @@
           <a:p>
             <a:fld id="{5BCAD085-E8A6-8845-BD4E-CB4CCA059FC4}" type="datetimeFigureOut">
               <a:rPr lang="en-US" smtClean="0"/>
-              <a:t>1/27/13</a:t>
             </a:fld>
             <a:endParaRPr lang="en-US"/>
           </a:p>
@@ -2296,18 +2284,12 @@
           <a:p>
             <a:fld id="{C1FF6DA9-008F-8B48-92A6-B652298478BF}" type="slidenum">
               <a:rPr lang="en-US" smtClean="0"/>
-              <a:t>‹#›</a:t>
             </a:fld>
             <a:endParaRPr lang="en-US"/>
           </a:p>
         </p:txBody>
       </p:sp>
     </p:spTree>
-    <p:extLst>
-      <p:ext uri="{BB962C8B-B14F-4D97-AF65-F5344CB8AC3E}">
-        <p14:creationId xmlns:p14="http://schemas.microsoft.com/office/powerpoint/2010/main" val="1840726560"/>
-      </p:ext>
-    </p:extLst>
   </p:cSld>
   <p:clrMapOvr>
     <a:masterClrMapping/>
@@ -2487,6 +2469,7 @@
               <a:rPr lang="en-US" smtClean="0"/>
               <a:t>Click to edit Master text styles</a:t>
             </a:r>
+            <a:endParaRPr lang="en-US" smtClean="0"/>
           </a:p>
         </p:txBody>
       </p:sp>
@@ -2507,7 +2490,6 @@
           <a:p>
             <a:fld id="{5BCAD085-E8A6-8845-BD4E-CB4CCA059FC4}" type="datetimeFigureOut">
               <a:rPr lang="en-US" smtClean="0"/>
-              <a:t>1/27/13</a:t>
             </a:fld>
             <a:endParaRPr lang="en-US"/>
           </a:p>
@@ -2549,18 +2531,12 @@
           <a:p>
             <a:fld id="{C1FF6DA9-008F-8B48-92A6-B652298478BF}" type="slidenum">
               <a:rPr lang="en-US" smtClean="0"/>
-              <a:t>‹#›</a:t>
             </a:fld>
             <a:endParaRPr lang="en-US"/>
           </a:p>
         </p:txBody>
       </p:sp>
     </p:spTree>
-    <p:extLst>
-      <p:ext uri="{BB962C8B-B14F-4D97-AF65-F5344CB8AC3E}">
-        <p14:creationId xmlns:p14="http://schemas.microsoft.com/office/powerpoint/2010/main" val="3889236939"/>
-      </p:ext>
-    </p:extLst>
   </p:cSld>
   <p:clrMapOvr>
     <a:masterClrMapping/>
@@ -2653,6 +2629,7 @@
               <a:rPr lang="en-US" smtClean="0"/>
               <a:t>Click to edit Master text styles</a:t>
             </a:r>
+            <a:endParaRPr lang="en-US" smtClean="0"/>
           </a:p>
           <a:p>
             <a:pPr lvl="1"/>
@@ -2660,6 +2637,7 @@
               <a:rPr lang="en-US" smtClean="0"/>
               <a:t>Second level</a:t>
             </a:r>
+            <a:endParaRPr lang="en-US" smtClean="0"/>
           </a:p>
           <a:p>
             <a:pPr lvl="2"/>
@@ -2667,6 +2645,7 @@
               <a:rPr lang="en-US" smtClean="0"/>
               <a:t>Third level</a:t>
             </a:r>
+            <a:endParaRPr lang="en-US" smtClean="0"/>
           </a:p>
           <a:p>
             <a:pPr lvl="3"/>
@@ -2674,6 +2653,7 @@
               <a:rPr lang="en-US" smtClean="0"/>
               <a:t>Fourth level</a:t>
             </a:r>
+            <a:endParaRPr lang="en-US" smtClean="0"/>
           </a:p>
           <a:p>
             <a:pPr lvl="4"/>
@@ -2720,7 +2700,6 @@
           <a:p>
             <a:fld id="{5BCAD085-E8A6-8845-BD4E-CB4CCA059FC4}" type="datetimeFigureOut">
               <a:rPr lang="en-US" smtClean="0"/>
-              <a:t>1/27/13</a:t>
             </a:fld>
             <a:endParaRPr lang="en-US"/>
           </a:p>
@@ -2798,18 +2777,12 @@
           <a:p>
             <a:fld id="{C1FF6DA9-008F-8B48-92A6-B652298478BF}" type="slidenum">
               <a:rPr lang="en-US" smtClean="0"/>
-              <a:t>‹#›</a:t>
             </a:fld>
             <a:endParaRPr lang="en-US"/>
           </a:p>
         </p:txBody>
       </p:sp>
     </p:spTree>
-    <p:extLst>
-      <p:ext uri="{BB962C8B-B14F-4D97-AF65-F5344CB8AC3E}">
-        <p14:creationId xmlns:p14="http://schemas.microsoft.com/office/powerpoint/2010/main" val="2209977519"/>
-      </p:ext>
-    </p:extLst>
   </p:cSld>
   <p:clrMap bg1="lt1" tx1="dk1" bg2="lt2" tx2="dk2" accent1="accent1" accent2="accent2" accent3="accent3" accent4="accent4" accent5="accent5" accent6="accent6" hlink="hlink" folHlink="folHlink"/>
   <p:sldLayoutIdLst>
@@ -2847,7 +2820,7 @@
         <a:spcBef>
           <a:spcPct val="20000"/>
         </a:spcBef>
-        <a:buFont typeface="Arial"/>
+        <a:buFont typeface="Arial" panose="020B0604020202090204"/>
         <a:buChar char="•"/>
         <a:defRPr sz="3200" kern="1200">
           <a:solidFill>
@@ -2862,7 +2835,7 @@
         <a:spcBef>
           <a:spcPct val="20000"/>
         </a:spcBef>
-        <a:buFont typeface="Arial"/>
+        <a:buFont typeface="Arial" panose="020B0604020202090204"/>
         <a:buChar char="–"/>
         <a:defRPr sz="2800" kern="1200">
           <a:solidFill>
@@ -2877,7 +2850,7 @@
         <a:spcBef>
           <a:spcPct val="20000"/>
         </a:spcBef>
-        <a:buFont typeface="Arial"/>
+        <a:buFont typeface="Arial" panose="020B0604020202090204"/>
         <a:buChar char="•"/>
         <a:defRPr sz="2400" kern="1200">
           <a:solidFill>
@@ -2892,7 +2865,7 @@
         <a:spcBef>
           <a:spcPct val="20000"/>
         </a:spcBef>
-        <a:buFont typeface="Arial"/>
+        <a:buFont typeface="Arial" panose="020B0604020202090204"/>
         <a:buChar char="–"/>
         <a:defRPr sz="2000" kern="1200">
           <a:solidFill>
@@ -2907,7 +2880,7 @@
         <a:spcBef>
           <a:spcPct val="20000"/>
         </a:spcBef>
-        <a:buFont typeface="Arial"/>
+        <a:buFont typeface="Arial" panose="020B0604020202090204"/>
         <a:buChar char="»"/>
         <a:defRPr sz="2000" kern="1200">
           <a:solidFill>
@@ -2922,7 +2895,7 @@
         <a:spcBef>
           <a:spcPct val="20000"/>
         </a:spcBef>
-        <a:buFont typeface="Arial"/>
+        <a:buFont typeface="Arial" panose="020B0604020202090204"/>
         <a:buChar char="•"/>
         <a:defRPr sz="2000" kern="1200">
           <a:solidFill>
@@ -2937,7 +2910,7 @@
         <a:spcBef>
           <a:spcPct val="20000"/>
         </a:spcBef>
-        <a:buFont typeface="Arial"/>
+        <a:buFont typeface="Arial" panose="020B0604020202090204"/>
         <a:buChar char="•"/>
         <a:defRPr sz="2000" kern="1200">
           <a:solidFill>
@@ -2952,7 +2925,7 @@
         <a:spcBef>
           <a:spcPct val="20000"/>
         </a:spcBef>
-        <a:buFont typeface="Arial"/>
+        <a:buFont typeface="Arial" panose="020B0604020202090204"/>
         <a:buChar char="•"/>
         <a:defRPr sz="2000" kern="1200">
           <a:solidFill>
@@ -2967,7 +2940,7 @@
         <a:spcBef>
           <a:spcPct val="20000"/>
         </a:spcBef>
-        <a:buFont typeface="Arial"/>
+        <a:buFont typeface="Arial" panose="020B0604020202090204"/>
         <a:buChar char="•"/>
         <a:defRPr sz="2000" kern="1200">
           <a:solidFill>
@@ -3079,7 +3052,7 @@
 </file>
 
 <file path=ppt/slides/slide1.xml><?xml version="1.0" encoding="utf-8"?>
-<p:sld xmlns:a="http://schemas.openxmlformats.org/drawingml/2006/main" xmlns:p="http://schemas.openxmlformats.org/presentationml/2006/main" xmlns:r="http://schemas.openxmlformats.org/officeDocument/2006/relationships">
+<p:sld xmlns:a="http://schemas.openxmlformats.org/drawingml/2006/main" xmlns:r="http://schemas.openxmlformats.org/officeDocument/2006/relationships" xmlns:p="http://schemas.openxmlformats.org/presentationml/2006/main">
   <p:cSld>
     <p:spTree>
       <p:nvGrpSpPr>
@@ -3126,7 +3099,7 @@
           </a:fontRef>
         </p:style>
         <p:txBody>
-          <a:bodyPr rtlCol="0" anchor="ctr" wrap="square">
+          <a:bodyPr wrap="square" rtlCol="0" anchor="ctr">
             <a:spAutoFit/>
           </a:bodyPr>
           <a:lstStyle/>
@@ -3139,8 +3112,18 @@
               </a:defRPr>
             </a:pPr>
             <a:r>
+              <a:rPr>
+                <a:solidFill>
+                  <a:schemeClr val="bg1"/>
+                </a:solidFill>
+              </a:rPr>
               <a:t>实例映射研讨会的参考结果</a:t>
             </a:r>
+            <a:endParaRPr>
+              <a:solidFill>
+                <a:schemeClr val="bg1"/>
+              </a:solidFill>
+            </a:endParaRPr>
           </a:p>
         </p:txBody>
       </p:sp>
@@ -3182,7 +3165,7 @@
           </a:fontRef>
         </p:style>
         <p:txBody>
-          <a:bodyPr rtlCol="0" anchor="ctr" wrap="square">
+          <a:bodyPr wrap="square" rtlCol="0" anchor="ctr">
             <a:spAutoFit/>
           </a:bodyPr>
           <a:lstStyle/>
@@ -3208,8 +3191,8 @@
         </p:nvSpPr>
         <p:spPr>
           <a:xfrm>
-            <a:off x="7589520" y="514350"/>
-            <a:ext cx="1371600" cy="128587"/>
+            <a:off x="7269480" y="599440"/>
+            <a:ext cx="1499870" cy="294005"/>
           </a:xfrm>
           <a:prstGeom prst="rect">
             <a:avLst/>
@@ -3238,8 +3221,8 @@
           </a:fontRef>
         </p:style>
         <p:txBody>
-          <a:bodyPr rtlCol="0" anchor="ctr" wrap="square">
-            <a:spAutoFit/>
+          <a:bodyPr wrap="square" rtlCol="0" anchor="ctr">
+            <a:noAutofit/>
           </a:bodyPr>
           <a:lstStyle/>
           <a:p>
@@ -3251,8 +3234,21 @@
               </a:defRPr>
             </a:pPr>
             <a:r>
-              <a:t>捷普AI智能管理平台</a:t>
-            </a:r>
+              <a:rPr lang="zh-CN"/>
+              <a:t>优普丰</a:t>
+            </a:r>
+            <a:r>
+              <a:t>AI</a:t>
+            </a:r>
+            <a:r>
+              <a:rPr lang="zh-CN"/>
+              <a:t>敏捷咨询</a:t>
+            </a:r>
+            <a:r>
+              <a:rPr lang="zh-CN"/>
+              <a:t>管理</a:t>
+            </a:r>
+            <a:endParaRPr lang="zh-CN"/>
           </a:p>
         </p:txBody>
       </p:sp>
@@ -3294,7 +3290,7 @@
           </a:fontRef>
         </p:style>
         <p:txBody>
-          <a:bodyPr rtlCol="0" anchor="ctr" wrap="square">
+          <a:bodyPr wrap="square" rtlCol="0" anchor="ctr">
             <a:spAutoFit/>
           </a:bodyPr>
           <a:lstStyle/>
@@ -3350,7 +3346,7 @@
           </a:fontRef>
         </p:style>
         <p:txBody>
-          <a:bodyPr rtlCol="0" anchor="ctr" wrap="square">
+          <a:bodyPr wrap="square" rtlCol="0" anchor="ctr">
             <a:spAutoFit/>
           </a:bodyPr>
           <a:lstStyle/>
@@ -3406,7 +3402,7 @@
           </a:fontRef>
         </p:style>
         <p:txBody>
-          <a:bodyPr rtlCol="0" anchor="ctr" wrap="square">
+          <a:bodyPr wrap="square" rtlCol="0" anchor="ctr">
             <a:spAutoFit/>
           </a:bodyPr>
           <a:lstStyle/>
@@ -3462,7 +3458,7 @@
           </a:fontRef>
         </p:style>
         <p:txBody>
-          <a:bodyPr rtlCol="0" anchor="ctr" wrap="square">
+          <a:bodyPr wrap="square" rtlCol="0" anchor="ctr">
             <a:spAutoFit/>
           </a:bodyPr>
           <a:lstStyle/>
@@ -3518,7 +3514,7 @@
           </a:fontRef>
         </p:style>
         <p:txBody>
-          <a:bodyPr rtlCol="0" anchor="ctr" wrap="square">
+          <a:bodyPr wrap="square" rtlCol="0" anchor="ctr">
             <a:spAutoFit/>
           </a:bodyPr>
           <a:lstStyle/>
@@ -3574,7 +3570,7 @@
           </a:fontRef>
         </p:style>
         <p:txBody>
-          <a:bodyPr rtlCol="0" anchor="ctr" wrap="square">
+          <a:bodyPr wrap="square" rtlCol="0" anchor="ctr">
             <a:spAutoFit/>
           </a:bodyPr>
           <a:lstStyle/>
@@ -3630,7 +3626,7 @@
           </a:fontRef>
         </p:style>
         <p:txBody>
-          <a:bodyPr rtlCol="0" anchor="ctr" wrap="square">
+          <a:bodyPr wrap="square" rtlCol="0" anchor="ctr">
             <a:spAutoFit/>
           </a:bodyPr>
           <a:lstStyle/>
@@ -3686,7 +3682,7 @@
           </a:fontRef>
         </p:style>
         <p:txBody>
-          <a:bodyPr rtlCol="0" anchor="ctr" wrap="square">
+          <a:bodyPr wrap="square" rtlCol="0" anchor="ctr">
             <a:spAutoFit/>
           </a:bodyPr>
           <a:lstStyle/>
@@ -3742,7 +3738,7 @@
           </a:fontRef>
         </p:style>
         <p:txBody>
-          <a:bodyPr rtlCol="0" anchor="ctr" wrap="square">
+          <a:bodyPr wrap="square" rtlCol="0" anchor="ctr">
             <a:spAutoFit/>
           </a:bodyPr>
           <a:lstStyle/>
@@ -3798,7 +3794,7 @@
           </a:fontRef>
         </p:style>
         <p:txBody>
-          <a:bodyPr rtlCol="0" anchor="ctr" wrap="square">
+          <a:bodyPr wrap="square" rtlCol="0" anchor="ctr">
             <a:spAutoFit/>
           </a:bodyPr>
           <a:lstStyle/>
@@ -3854,7 +3850,7 @@
           </a:fontRef>
         </p:style>
         <p:txBody>
-          <a:bodyPr rtlCol="0" anchor="ctr" wrap="square">
+          <a:bodyPr wrap="square" rtlCol="0" anchor="ctr">
             <a:spAutoFit/>
           </a:bodyPr>
           <a:lstStyle/>
@@ -3910,7 +3906,7 @@
           </a:fontRef>
         </p:style>
         <p:txBody>
-          <a:bodyPr rtlCol="0" anchor="ctr" wrap="square">
+          <a:bodyPr wrap="square" rtlCol="0" anchor="ctr">
             <a:spAutoFit/>
           </a:bodyPr>
           <a:lstStyle/>
@@ -3966,7 +3962,7 @@
           </a:fontRef>
         </p:style>
         <p:txBody>
-          <a:bodyPr rtlCol="0" anchor="ctr" wrap="square">
+          <a:bodyPr wrap="square" rtlCol="0" anchor="ctr">
             <a:spAutoFit/>
           </a:bodyPr>
           <a:lstStyle/>
@@ -4022,7 +4018,7 @@
           </a:fontRef>
         </p:style>
         <p:txBody>
-          <a:bodyPr rtlCol="0" anchor="ctr" wrap="square">
+          <a:bodyPr wrap="square" rtlCol="0" anchor="ctr">
             <a:spAutoFit/>
           </a:bodyPr>
           <a:lstStyle/>
@@ -4078,7 +4074,7 @@
           </a:fontRef>
         </p:style>
         <p:txBody>
-          <a:bodyPr rtlCol="0" anchor="ctr" wrap="square">
+          <a:bodyPr wrap="square" rtlCol="0" anchor="ctr">
             <a:spAutoFit/>
           </a:bodyPr>
           <a:lstStyle/>
@@ -4134,7 +4130,7 @@
           </a:fontRef>
         </p:style>
         <p:txBody>
-          <a:bodyPr rtlCol="0" anchor="ctr" wrap="square">
+          <a:bodyPr wrap="square" rtlCol="0" anchor="ctr">
             <a:spAutoFit/>
           </a:bodyPr>
           <a:lstStyle/>
@@ -4190,7 +4186,7 @@
           </a:fontRef>
         </p:style>
         <p:txBody>
-          <a:bodyPr rtlCol="0" anchor="ctr" wrap="square">
+          <a:bodyPr wrap="square" rtlCol="0" anchor="ctr">
             <a:spAutoFit/>
           </a:bodyPr>
           <a:lstStyle/>
@@ -4246,7 +4242,7 @@
           </a:fontRef>
         </p:style>
         <p:txBody>
-          <a:bodyPr rtlCol="0" anchor="ctr" wrap="square">
+          <a:bodyPr wrap="square" rtlCol="0" anchor="ctr">
             <a:spAutoFit/>
           </a:bodyPr>
           <a:lstStyle/>
@@ -4302,7 +4298,7 @@
           </a:fontRef>
         </p:style>
         <p:txBody>
-          <a:bodyPr rtlCol="0" anchor="ctr" wrap="square">
+          <a:bodyPr wrap="square" rtlCol="0" anchor="ctr">
             <a:spAutoFit/>
           </a:bodyPr>
           <a:lstStyle/>
@@ -5159,6 +5155,10 @@
       </a:style>
     </a:lnDef>
   </a:objectDefaults>
-  <a:extraClrSchemeLst/>
+  <a:extLst>
+    <a:ext uri="{05A4C25C-085E-4340-85A3-A5531E510DB2}">
+      <thm15:themeFamily xmlns:thm15="http://schemas.microsoft.com/office/thememl/2012/main" name="Office Theme" id="{62F939B6-93AF-4DB8-9C6B-D6C7DFDC589F}" vid="{4A3C46E8-61CC-4603-A589-7422A47A8E4A}"/>
+    </a:ext>
+  </a:extLst>
 </a:theme>
 </file>
</xml_diff>